<commit_message>
add link github to ppt
</commit_message>
<xml_diff>
--- a/NSTProject_HTS.pptx
+++ b/NSTProject_HTS.pptx
@@ -3337,7 +3337,7 @@
               </a:lnSpc>
             </a:pPr>
             <a:r>
-              <a:rPr lang="en-US" sz="9650">
+              <a:rPr lang="en-US" sz="9650" dirty="0">
                 <a:solidFill>
                   <a:srgbClr val="000000"/>
                 </a:solidFill>
@@ -3380,7 +3380,7 @@
         </p:nvSpPr>
         <p:spPr>
           <a:xfrm>
-            <a:off x="6907474" y="6114414"/>
+            <a:off x="6878404" y="5480492"/>
             <a:ext cx="4473052" cy="1110808"/>
           </a:xfrm>
           <a:custGeom>
@@ -3689,6 +3689,57 @@
           </p:txBody>
         </p:sp>
       </p:grpSp>
+      <p:sp>
+        <p:nvSpPr>
+          <p:cNvPr id="15" name="TextBox 5">
+            <a:extLst>
+              <a:ext uri="{FF2B5EF4-FFF2-40B4-BE49-F238E27FC236}">
+                <a16:creationId xmlns:a16="http://schemas.microsoft.com/office/drawing/2014/main" id="{DE7D6A54-E789-DF34-6E80-B340D2352A72}"/>
+              </a:ext>
+            </a:extLst>
+          </p:cNvPr>
+          <p:cNvSpPr txBox="1"/>
+          <p:nvPr/>
+        </p:nvSpPr>
+        <p:spPr>
+          <a:xfrm>
+            <a:off x="1928223" y="6362700"/>
+            <a:ext cx="14431554" cy="1129733"/>
+          </a:xfrm>
+          <a:prstGeom prst="rect">
+            <a:avLst/>
+          </a:prstGeom>
+        </p:spPr>
+        <p:txBody>
+          <a:bodyPr lIns="0" tIns="0" rIns="0" bIns="0" rtlCol="0" anchor="t">
+            <a:spAutoFit/>
+          </a:bodyPr>
+          <a:lstStyle/>
+          <a:p>
+            <a:pPr algn="ctr">
+              <a:lnSpc>
+                <a:spcPts val="10615"/>
+              </a:lnSpc>
+            </a:pPr>
+            <a:r>
+              <a:rPr lang="en-US" sz="3200" dirty="0">
+                <a:solidFill>
+                  <a:srgbClr val="000000"/>
+                </a:solidFill>
+                <a:latin typeface="Agrandir"/>
+                <a:hlinkClick r:id="rId7"/>
+              </a:rPr>
+              <a:t>https://github.com/hardiantots/nst_projectHTS.git</a:t>
+            </a:r>
+            <a:endParaRPr lang="en-US" sz="3200" dirty="0">
+              <a:solidFill>
+                <a:srgbClr val="000000"/>
+              </a:solidFill>
+              <a:latin typeface="Agrandir"/>
+            </a:endParaRPr>
+          </a:p>
+        </p:txBody>
+      </p:sp>
     </p:spTree>
   </p:cSld>
   <p:clrMapOvr>
@@ -6162,7 +6213,7 @@
         <p:spPr>
           <a:xfrm>
             <a:off x="1401437" y="2156046"/>
-            <a:ext cx="15485125" cy="7271927"/>
+            <a:ext cx="15485125" cy="7938776"/>
           </a:xfrm>
           <a:prstGeom prst="rect">
             <a:avLst/>
@@ -6180,7 +6231,7 @@
               </a:lnSpc>
             </a:pPr>
             <a:r>
-              <a:rPr lang="en-US" sz="2999" dirty="0">
+              <a:rPr lang="en-US" sz="2800" dirty="0">
                 <a:solidFill>
                   <a:srgbClr val="000000"/>
                 </a:solidFill>
@@ -6189,7 +6240,7 @@
               <a:t>From the various explanations and stages of implementing Neural Style Transfer on </a:t>
             </a:r>
             <a:r>
-              <a:rPr lang="en-US" sz="2999" dirty="0" err="1">
+              <a:rPr lang="en-US" sz="2800" dirty="0" err="1">
                 <a:solidFill>
                   <a:srgbClr val="000000"/>
                 </a:solidFill>
@@ -6198,7 +6249,7 @@
               <a:t>PyTorch</a:t>
             </a:r>
             <a:r>
-              <a:rPr lang="en-US" sz="2999" dirty="0">
+              <a:rPr lang="en-US" sz="2800" dirty="0">
                 <a:solidFill>
                   <a:srgbClr val="000000"/>
                 </a:solidFill>
@@ -6207,7 +6258,7 @@
               <a:t>, I can conclude that this </a:t>
             </a:r>
             <a:r>
-              <a:rPr lang="en-US" sz="2999" dirty="0">
+              <a:rPr lang="en-US" sz="2800" dirty="0">
                 <a:solidFill>
                   <a:srgbClr val="000000"/>
                 </a:solidFill>
@@ -6216,7 +6267,7 @@
               <a:t>NST has quite different implementation stages </a:t>
             </a:r>
             <a:r>
-              <a:rPr lang="en-US" sz="2999" dirty="0">
+              <a:rPr lang="en-US" sz="2800" dirty="0">
                 <a:solidFill>
                   <a:srgbClr val="000000"/>
                 </a:solidFill>
@@ -6231,7 +6282,7 @@
                 <a:spcPts val="5159"/>
               </a:lnSpc>
             </a:pPr>
-            <a:endParaRPr lang="en-US" sz="2999" dirty="0">
+            <a:endParaRPr lang="en-US" sz="2800" dirty="0">
               <a:solidFill>
                 <a:srgbClr val="000000"/>
               </a:solidFill>
@@ -6245,7 +6296,7 @@
               </a:lnSpc>
             </a:pPr>
             <a:r>
-              <a:rPr lang="en-US" sz="2999" dirty="0">
+              <a:rPr lang="en-US" sz="2800" dirty="0">
                 <a:solidFill>
                   <a:srgbClr val="000000"/>
                 </a:solidFill>
@@ -6254,7 +6305,7 @@
               <a:t>Apart from that, from implementing it on </a:t>
             </a:r>
             <a:r>
-              <a:rPr lang="en-US" sz="2999" dirty="0" err="1">
+              <a:rPr lang="en-US" sz="2800" dirty="0" err="1">
                 <a:solidFill>
                   <a:srgbClr val="000000"/>
                 </a:solidFill>
@@ -6263,7 +6314,7 @@
               <a:t>PyTorch</a:t>
             </a:r>
             <a:r>
-              <a:rPr lang="en-US" sz="2999" dirty="0">
+              <a:rPr lang="en-US" sz="2800" dirty="0">
                 <a:solidFill>
                   <a:srgbClr val="000000"/>
                 </a:solidFill>
@@ -6278,7 +6329,7 @@
                 <a:spcPts val="5159"/>
               </a:lnSpc>
             </a:pPr>
-            <a:endParaRPr lang="en-US" sz="2999" dirty="0">
+            <a:endParaRPr lang="en-US" sz="2800" dirty="0">
               <a:solidFill>
                 <a:srgbClr val="000000"/>
               </a:solidFill>
@@ -6292,7 +6343,7 @@
               </a:lnSpc>
             </a:pPr>
             <a:r>
-              <a:rPr lang="en-US" sz="2999" dirty="0">
+              <a:rPr lang="en-US" sz="2800" dirty="0">
                 <a:solidFill>
                   <a:srgbClr val="000000"/>
                 </a:solidFill>
@@ -6301,7 +6352,7 @@
               <a:t>To see the completed code, </a:t>
             </a:r>
             <a:r>
-              <a:rPr lang="en-US" sz="2999" b="1" dirty="0">
+              <a:rPr lang="en-US" sz="2800" b="1" dirty="0">
                 <a:solidFill>
                   <a:srgbClr val="000000"/>
                 </a:solidFill>
@@ -6310,7 +6361,7 @@
               <a:t>can see in </a:t>
             </a:r>
             <a:r>
-              <a:rPr lang="en-US" sz="2999" b="1" dirty="0" err="1">
+              <a:rPr lang="en-US" sz="2800" b="1" dirty="0" err="1">
                 <a:solidFill>
                   <a:srgbClr val="000000"/>
                 </a:solidFill>
@@ -6319,7 +6370,7 @@
               <a:t>ipynb</a:t>
             </a:r>
             <a:r>
-              <a:rPr lang="en-US" sz="2999" b="1" dirty="0">
+              <a:rPr lang="en-US" sz="2800" b="1" dirty="0">
                 <a:solidFill>
                   <a:srgbClr val="000000"/>
                 </a:solidFill>
@@ -6327,6 +6378,42 @@
               </a:rPr>
               <a:t> file in GitHub</a:t>
             </a:r>
+          </a:p>
+          <a:p>
+            <a:pPr algn="just">
+              <a:lnSpc>
+                <a:spcPts val="5159"/>
+              </a:lnSpc>
+            </a:pPr>
+            <a:r>
+              <a:rPr lang="en-US" sz="2400" dirty="0">
+                <a:solidFill>
+                  <a:srgbClr val="000000"/>
+                </a:solidFill>
+                <a:latin typeface="Agrandir"/>
+                <a:hlinkClick r:id="rId2"/>
+              </a:rPr>
+              <a:t>https://github.com/hardiantots/nst_projectHTS.git</a:t>
+            </a:r>
+            <a:endParaRPr lang="en-US" sz="2400" dirty="0">
+              <a:solidFill>
+                <a:srgbClr val="000000"/>
+              </a:solidFill>
+              <a:latin typeface="Agrandir"/>
+            </a:endParaRPr>
+          </a:p>
+          <a:p>
+            <a:pPr algn="just">
+              <a:lnSpc>
+                <a:spcPts val="5159"/>
+              </a:lnSpc>
+            </a:pPr>
+            <a:endParaRPr lang="en-US" sz="2800" b="1" dirty="0">
+              <a:solidFill>
+                <a:srgbClr val="000000"/>
+              </a:solidFill>
+              <a:latin typeface="Agrandir Bold" panose="020B0604020202020204" charset="0"/>
+            </a:endParaRPr>
           </a:p>
         </p:txBody>
       </p:sp>

</xml_diff>